<commit_message>
Image inserted, need to make titles and modify them
</commit_message>
<xml_diff>
--- a/Poster.pptx
+++ b/Poster.pptx
@@ -104,6 +104,11 @@
       </a:defRPr>
     </a:lvl9pPr>
   </p:defaultTextStyle>
+  <p:extLst>
+    <p:ext uri="{EFAFB233-063F-42B5-8137-9DF3F51BA10A}">
+      <p15:sldGuideLst xmlns:p15="http://schemas.microsoft.com/office/powerpoint/2012/main"/>
+    </p:ext>
+  </p:extLst>
 </p:presentation>
 </file>
 
@@ -242,7 +247,7 @@
           <a:p>
             <a:fld id="{211BC370-492A-4059-9103-5F3088E214E4}" type="datetimeFigureOut">
               <a:rPr lang="fr-FR" smtClean="0"/>
-              <a:t>19/01/2018</a:t>
+              <a:t>20/01/2018</a:t>
             </a:fld>
             <a:endParaRPr lang="fr-FR"/>
           </a:p>
@@ -412,7 +417,7 @@
           <a:p>
             <a:fld id="{211BC370-492A-4059-9103-5F3088E214E4}" type="datetimeFigureOut">
               <a:rPr lang="fr-FR" smtClean="0"/>
-              <a:t>19/01/2018</a:t>
+              <a:t>20/01/2018</a:t>
             </a:fld>
             <a:endParaRPr lang="fr-FR"/>
           </a:p>
@@ -592,7 +597,7 @@
           <a:p>
             <a:fld id="{211BC370-492A-4059-9103-5F3088E214E4}" type="datetimeFigureOut">
               <a:rPr lang="fr-FR" smtClean="0"/>
-              <a:t>19/01/2018</a:t>
+              <a:t>20/01/2018</a:t>
             </a:fld>
             <a:endParaRPr lang="fr-FR"/>
           </a:p>
@@ -762,7 +767,7 @@
           <a:p>
             <a:fld id="{211BC370-492A-4059-9103-5F3088E214E4}" type="datetimeFigureOut">
               <a:rPr lang="fr-FR" smtClean="0"/>
-              <a:t>19/01/2018</a:t>
+              <a:t>20/01/2018</a:t>
             </a:fld>
             <a:endParaRPr lang="fr-FR"/>
           </a:p>
@@ -1006,7 +1011,7 @@
           <a:p>
             <a:fld id="{211BC370-492A-4059-9103-5F3088E214E4}" type="datetimeFigureOut">
               <a:rPr lang="fr-FR" smtClean="0"/>
-              <a:t>19/01/2018</a:t>
+              <a:t>20/01/2018</a:t>
             </a:fld>
             <a:endParaRPr lang="fr-FR"/>
           </a:p>
@@ -1238,7 +1243,7 @@
           <a:p>
             <a:fld id="{211BC370-492A-4059-9103-5F3088E214E4}" type="datetimeFigureOut">
               <a:rPr lang="fr-FR" smtClean="0"/>
-              <a:t>19/01/2018</a:t>
+              <a:t>20/01/2018</a:t>
             </a:fld>
             <a:endParaRPr lang="fr-FR"/>
           </a:p>
@@ -1605,7 +1610,7 @@
           <a:p>
             <a:fld id="{211BC370-492A-4059-9103-5F3088E214E4}" type="datetimeFigureOut">
               <a:rPr lang="fr-FR" smtClean="0"/>
-              <a:t>19/01/2018</a:t>
+              <a:t>20/01/2018</a:t>
             </a:fld>
             <a:endParaRPr lang="fr-FR"/>
           </a:p>
@@ -1723,7 +1728,7 @@
           <a:p>
             <a:fld id="{211BC370-492A-4059-9103-5F3088E214E4}" type="datetimeFigureOut">
               <a:rPr lang="fr-FR" smtClean="0"/>
-              <a:t>19/01/2018</a:t>
+              <a:t>20/01/2018</a:t>
             </a:fld>
             <a:endParaRPr lang="fr-FR"/>
           </a:p>
@@ -1818,7 +1823,7 @@
           <a:p>
             <a:fld id="{211BC370-492A-4059-9103-5F3088E214E4}" type="datetimeFigureOut">
               <a:rPr lang="fr-FR" smtClean="0"/>
-              <a:t>19/01/2018</a:t>
+              <a:t>20/01/2018</a:t>
             </a:fld>
             <a:endParaRPr lang="fr-FR"/>
           </a:p>
@@ -2095,7 +2100,7 @@
           <a:p>
             <a:fld id="{211BC370-492A-4059-9103-5F3088E214E4}" type="datetimeFigureOut">
               <a:rPr lang="fr-FR" smtClean="0"/>
-              <a:t>19/01/2018</a:t>
+              <a:t>20/01/2018</a:t>
             </a:fld>
             <a:endParaRPr lang="fr-FR"/>
           </a:p>
@@ -2352,7 +2357,7 @@
           <a:p>
             <a:fld id="{211BC370-492A-4059-9103-5F3088E214E4}" type="datetimeFigureOut">
               <a:rPr lang="fr-FR" smtClean="0"/>
-              <a:t>19/01/2018</a:t>
+              <a:t>20/01/2018</a:t>
             </a:fld>
             <a:endParaRPr lang="fr-FR"/>
           </a:p>
@@ -2565,7 +2570,7 @@
           <a:p>
             <a:fld id="{211BC370-492A-4059-9103-5F3088E214E4}" type="datetimeFigureOut">
               <a:rPr lang="fr-FR" smtClean="0"/>
-              <a:t>19/01/2018</a:t>
+              <a:t>20/01/2018</a:t>
             </a:fld>
             <a:endParaRPr lang="fr-FR"/>
           </a:p>
@@ -3020,6 +3025,150 @@
           </a:p>
         </p:txBody>
       </p:sp>
+      <p:pic>
+        <p:nvPicPr>
+          <p:cNvPr id="5" name="Image 4">
+            <a:extLst>
+              <a:ext uri="{FF2B5EF4-FFF2-40B4-BE49-F238E27FC236}">
+                <a16:creationId xmlns:a16="http://schemas.microsoft.com/office/drawing/2014/main" id="{D536E46D-0B2C-4E2F-B33C-2DD84D61FEB5}"/>
+              </a:ext>
+            </a:extLst>
+          </p:cNvPr>
+          <p:cNvPicPr>
+            <a:picLocks noChangeAspect="1"/>
+          </p:cNvPicPr>
+          <p:nvPr/>
+        </p:nvPicPr>
+        <p:blipFill>
+          <a:blip r:embed="rId2">
+            <a:extLst>
+              <a:ext uri="{28A0092B-C50C-407E-A947-70E740481C1C}">
+                <a14:useLocalDpi xmlns:a14="http://schemas.microsoft.com/office/drawing/2010/main" val="0"/>
+              </a:ext>
+            </a:extLst>
+          </a:blip>
+          <a:stretch>
+            <a:fillRect/>
+          </a:stretch>
+        </p:blipFill>
+        <p:spPr>
+          <a:xfrm>
+            <a:off x="0" y="19444221"/>
+            <a:ext cx="14941515" cy="14941515"/>
+          </a:xfrm>
+          <a:prstGeom prst="rect">
+            <a:avLst/>
+          </a:prstGeom>
+        </p:spPr>
+      </p:pic>
+      <p:pic>
+        <p:nvPicPr>
+          <p:cNvPr id="7" name="Image 6">
+            <a:extLst>
+              <a:ext uri="{FF2B5EF4-FFF2-40B4-BE49-F238E27FC236}">
+                <a16:creationId xmlns:a16="http://schemas.microsoft.com/office/drawing/2014/main" id="{0E0D5390-0AE2-4BC5-97CB-94D650EE8CB4}"/>
+              </a:ext>
+            </a:extLst>
+          </p:cNvPr>
+          <p:cNvPicPr>
+            <a:picLocks noChangeAspect="1"/>
+          </p:cNvPicPr>
+          <p:nvPr/>
+        </p:nvPicPr>
+        <p:blipFill>
+          <a:blip r:embed="rId3">
+            <a:extLst>
+              <a:ext uri="{28A0092B-C50C-407E-A947-70E740481C1C}">
+                <a14:useLocalDpi xmlns:a14="http://schemas.microsoft.com/office/drawing/2010/main" val="0"/>
+              </a:ext>
+            </a:extLst>
+          </a:blip>
+          <a:stretch>
+            <a:fillRect/>
+          </a:stretch>
+        </p:blipFill>
+        <p:spPr>
+          <a:xfrm>
+            <a:off x="14716048" y="19929975"/>
+            <a:ext cx="14416297" cy="14416297"/>
+          </a:xfrm>
+          <a:prstGeom prst="rect">
+            <a:avLst/>
+          </a:prstGeom>
+        </p:spPr>
+      </p:pic>
+      <p:pic>
+        <p:nvPicPr>
+          <p:cNvPr id="9" name="Image 8">
+            <a:extLst>
+              <a:ext uri="{FF2B5EF4-FFF2-40B4-BE49-F238E27FC236}">
+                <a16:creationId xmlns:a16="http://schemas.microsoft.com/office/drawing/2014/main" id="{324B6820-400D-47A4-93ED-413ECE118AE4}"/>
+              </a:ext>
+            </a:extLst>
+          </p:cNvPr>
+          <p:cNvPicPr>
+            <a:picLocks noChangeAspect="1"/>
+          </p:cNvPicPr>
+          <p:nvPr/>
+        </p:nvPicPr>
+        <p:blipFill>
+          <a:blip r:embed="rId4">
+            <a:extLst>
+              <a:ext uri="{28A0092B-C50C-407E-A947-70E740481C1C}">
+                <a14:useLocalDpi xmlns:a14="http://schemas.microsoft.com/office/drawing/2010/main" val="0"/>
+              </a:ext>
+            </a:extLst>
+          </a:blip>
+          <a:stretch>
+            <a:fillRect/>
+          </a:stretch>
+        </p:blipFill>
+        <p:spPr>
+          <a:xfrm>
+            <a:off x="907116" y="34064585"/>
+            <a:ext cx="13808932" cy="8237258"/>
+          </a:xfrm>
+          <a:prstGeom prst="rect">
+            <a:avLst/>
+          </a:prstGeom>
+        </p:spPr>
+      </p:pic>
+      <p:pic>
+        <p:nvPicPr>
+          <p:cNvPr id="11" name="Image 10">
+            <a:extLst>
+              <a:ext uri="{FF2B5EF4-FFF2-40B4-BE49-F238E27FC236}">
+                <a16:creationId xmlns:a16="http://schemas.microsoft.com/office/drawing/2014/main" id="{049C186F-7141-48BE-8EA9-085C20B75C4A}"/>
+              </a:ext>
+            </a:extLst>
+          </p:cNvPr>
+          <p:cNvPicPr>
+            <a:picLocks noChangeAspect="1"/>
+          </p:cNvPicPr>
+          <p:nvPr/>
+        </p:nvPicPr>
+        <p:blipFill>
+          <a:blip r:embed="rId5">
+            <a:extLst>
+              <a:ext uri="{28A0092B-C50C-407E-A947-70E740481C1C}">
+                <a14:useLocalDpi xmlns:a14="http://schemas.microsoft.com/office/drawing/2010/main" val="0"/>
+              </a:ext>
+            </a:extLst>
+          </a:blip>
+          <a:stretch>
+            <a:fillRect/>
+          </a:stretch>
+        </p:blipFill>
+        <p:spPr>
+          <a:xfrm>
+            <a:off x="16086399" y="34385736"/>
+            <a:ext cx="13573183" cy="7916107"/>
+          </a:xfrm>
+          <a:prstGeom prst="rect">
+            <a:avLst/>
+          </a:prstGeom>
+        </p:spPr>
+      </p:pic>
     </p:spTree>
     <p:extLst>
       <p:ext uri="{BB962C8B-B14F-4D97-AF65-F5344CB8AC3E}">

</xml_diff>